<commit_message>
mapa de empatia atualizado
</commit_message>
<xml_diff>
--- a/Documentação/Documentação_Teorica/Jornada_Usuario V1(att).pptx
+++ b/Documentação/Documentação_Teorica/Jornada_Usuario V1(att).pptx
@@ -259,7 +259,7 @@
           <a:p>
             <a:fld id="{1031C30C-6021-461E-9557-3DA92FC53FF9}" type="datetimeFigureOut">
               <a:rPr lang="pt-BR" smtClean="0"/>
-              <a:t>07/03/2021</a:t>
+              <a:t>08/03/2021</a:t>
             </a:fld>
             <a:endParaRPr lang="pt-BR"/>
           </a:p>
@@ -457,7 +457,7 @@
           <a:p>
             <a:fld id="{1031C30C-6021-461E-9557-3DA92FC53FF9}" type="datetimeFigureOut">
               <a:rPr lang="pt-BR" smtClean="0"/>
-              <a:t>07/03/2021</a:t>
+              <a:t>08/03/2021</a:t>
             </a:fld>
             <a:endParaRPr lang="pt-BR"/>
           </a:p>
@@ -665,7 +665,7 @@
           <a:p>
             <a:fld id="{1031C30C-6021-461E-9557-3DA92FC53FF9}" type="datetimeFigureOut">
               <a:rPr lang="pt-BR" smtClean="0"/>
-              <a:t>07/03/2021</a:t>
+              <a:t>08/03/2021</a:t>
             </a:fld>
             <a:endParaRPr lang="pt-BR"/>
           </a:p>
@@ -1863,7 +1863,7 @@
           <a:p>
             <a:fld id="{1031C30C-6021-461E-9557-3DA92FC53FF9}" type="datetimeFigureOut">
               <a:rPr lang="pt-BR" smtClean="0"/>
-              <a:t>07/03/2021</a:t>
+              <a:t>08/03/2021</a:t>
             </a:fld>
             <a:endParaRPr lang="pt-BR"/>
           </a:p>
@@ -2138,7 +2138,7 @@
           <a:p>
             <a:fld id="{1031C30C-6021-461E-9557-3DA92FC53FF9}" type="datetimeFigureOut">
               <a:rPr lang="pt-BR" smtClean="0"/>
-              <a:t>07/03/2021</a:t>
+              <a:t>08/03/2021</a:t>
             </a:fld>
             <a:endParaRPr lang="pt-BR"/>
           </a:p>
@@ -2403,7 +2403,7 @@
           <a:p>
             <a:fld id="{1031C30C-6021-461E-9557-3DA92FC53FF9}" type="datetimeFigureOut">
               <a:rPr lang="pt-BR" smtClean="0"/>
-              <a:t>07/03/2021</a:t>
+              <a:t>08/03/2021</a:t>
             </a:fld>
             <a:endParaRPr lang="pt-BR"/>
           </a:p>
@@ -2815,7 +2815,7 @@
           <a:p>
             <a:fld id="{1031C30C-6021-461E-9557-3DA92FC53FF9}" type="datetimeFigureOut">
               <a:rPr lang="pt-BR" smtClean="0"/>
-              <a:t>07/03/2021</a:t>
+              <a:t>08/03/2021</a:t>
             </a:fld>
             <a:endParaRPr lang="pt-BR"/>
           </a:p>
@@ -2956,7 +2956,7 @@
           <a:p>
             <a:fld id="{1031C30C-6021-461E-9557-3DA92FC53FF9}" type="datetimeFigureOut">
               <a:rPr lang="pt-BR" smtClean="0"/>
-              <a:t>07/03/2021</a:t>
+              <a:t>08/03/2021</a:t>
             </a:fld>
             <a:endParaRPr lang="pt-BR"/>
           </a:p>
@@ -3069,7 +3069,7 @@
           <a:p>
             <a:fld id="{1031C30C-6021-461E-9557-3DA92FC53FF9}" type="datetimeFigureOut">
               <a:rPr lang="pt-BR" smtClean="0"/>
-              <a:t>07/03/2021</a:t>
+              <a:t>08/03/2021</a:t>
             </a:fld>
             <a:endParaRPr lang="pt-BR"/>
           </a:p>
@@ -3380,7 +3380,7 @@
           <a:p>
             <a:fld id="{1031C30C-6021-461E-9557-3DA92FC53FF9}" type="datetimeFigureOut">
               <a:rPr lang="pt-BR" smtClean="0"/>
-              <a:t>07/03/2021</a:t>
+              <a:t>08/03/2021</a:t>
             </a:fld>
             <a:endParaRPr lang="pt-BR"/>
           </a:p>
@@ -3668,7 +3668,7 @@
           <a:p>
             <a:fld id="{1031C30C-6021-461E-9557-3DA92FC53FF9}" type="datetimeFigureOut">
               <a:rPr lang="pt-BR" smtClean="0"/>
-              <a:t>07/03/2021</a:t>
+              <a:t>08/03/2021</a:t>
             </a:fld>
             <a:endParaRPr lang="pt-BR"/>
           </a:p>
@@ -3909,7 +3909,7 @@
           <a:p>
             <a:fld id="{1031C30C-6021-461E-9557-3DA92FC53FF9}" type="datetimeFigureOut">
               <a:rPr lang="pt-BR" smtClean="0"/>
-              <a:t>07/03/2021</a:t>
+              <a:t>08/03/2021</a:t>
             </a:fld>
             <a:endParaRPr lang="pt-BR"/>
           </a:p>
@@ -4511,7 +4511,7 @@
           </a:p>
           <a:p>
             <a:r>
-              <a:rPr lang="pt-BR" sz="1400" dirty="0" smtClean="0">
+              <a:rPr lang="pt-BR" sz="1400" dirty="0">
                 <a:latin typeface="Exo 2" panose="00000500000000000000" pitchFamily="50" charset="0"/>
               </a:rPr>
               <a:t>Informa dados pessoais;</a:t>
@@ -4519,25 +4519,19 @@
           </a:p>
           <a:p>
             <a:r>
-              <a:rPr lang="pt-BR" sz="1400" dirty="0" smtClean="0">
+              <a:rPr lang="pt-BR" sz="1400" dirty="0">
                 <a:latin typeface="Exo 2" panose="00000500000000000000" pitchFamily="50" charset="0"/>
               </a:rPr>
-              <a:t>Usuário define qual o objetivo dele</a:t>
-            </a:r>
-            <a:r>
-              <a:rPr lang="pt-BR" sz="1400" dirty="0" smtClean="0">
-                <a:latin typeface="Exo 2" panose="00000500000000000000" pitchFamily="50" charset="0"/>
-              </a:rPr>
-              <a:t>  em prol do </a:t>
-            </a:r>
-            <a:r>
-              <a:rPr lang="pt-BR" sz="1400" dirty="0" err="1" smtClean="0">
+              <a:t>Usuário define qual o objetivo dele  em prol do </a:t>
+            </a:r>
+            <a:r>
+              <a:rPr lang="pt-BR" sz="1400" dirty="0" err="1">
                 <a:latin typeface="Exo 2" panose="00000500000000000000" pitchFamily="50" charset="0"/>
               </a:rPr>
               <a:t>app</a:t>
             </a:r>
             <a:r>
-              <a:rPr lang="pt-BR" sz="1400" dirty="0" smtClean="0">
+              <a:rPr lang="pt-BR" sz="1400" dirty="0">
                 <a:latin typeface="Exo 2" panose="00000500000000000000" pitchFamily="50" charset="0"/>
               </a:rPr>
               <a:t>;</a:t>
@@ -4545,14 +4539,11 @@
           </a:p>
           <a:p>
             <a:r>
-              <a:rPr lang="pt-BR" sz="1400" dirty="0" smtClean="0">
+              <a:rPr lang="pt-BR" sz="1400" dirty="0">
                 <a:latin typeface="Exo 2" panose="00000500000000000000" pitchFamily="50" charset="0"/>
               </a:rPr>
               <a:t>Como é o comportamento diário do usuário;</a:t>
             </a:r>
-            <a:endParaRPr lang="pt-BR" sz="1400" dirty="0">
-              <a:latin typeface="Exo 2" panose="00000500000000000000" pitchFamily="50" charset="0"/>
-            </a:endParaRPr>
           </a:p>
         </p:txBody>
       </p:sp>
@@ -4611,8 +4602,8 @@
         </p:nvSpPr>
         <p:spPr>
           <a:xfrm>
-            <a:off x="137132" y="656587"/>
-            <a:ext cx="1981647" cy="483081"/>
+            <a:off x="205224" y="505809"/>
+            <a:ext cx="1400496" cy="706347"/>
           </a:xfrm>
           <a:prstGeom prst="rect">
             <a:avLst/>
@@ -4716,7 +4707,7 @@
                 <a14:useLocalDpi xmlns:a14="http://schemas.microsoft.com/office/drawing/2010/main" val="0"/>
               </a:ext>
               <a:ext uri="{96DAC541-7B7A-43D3-8B79-37D633B846F1}">
-                <asvg:svgBlip xmlns:asvg="http://schemas.microsoft.com/office/drawing/2016/SVG/main" xmlns="" r:embed="rId3"/>
+                <asvg:svgBlip xmlns:asvg="http://schemas.microsoft.com/office/drawing/2016/SVG/main" r:embed="rId3"/>
               </a:ext>
             </a:extLst>
           </a:blip>
@@ -4755,7 +4746,7 @@
                 <a14:useLocalDpi xmlns:a14="http://schemas.microsoft.com/office/drawing/2010/main" val="0"/>
               </a:ext>
               <a:ext uri="{96DAC541-7B7A-43D3-8B79-37D633B846F1}">
-                <asvg:svgBlip xmlns:asvg="http://schemas.microsoft.com/office/drawing/2016/SVG/main" xmlns="" r:embed="rId5"/>
+                <asvg:svgBlip xmlns:asvg="http://schemas.microsoft.com/office/drawing/2016/SVG/main" r:embed="rId5"/>
               </a:ext>
             </a:extLst>
           </a:blip>
@@ -4765,7 +4756,7 @@
         </p:blipFill>
         <p:spPr>
           <a:xfrm>
-            <a:off x="2616942" y="2983691"/>
+            <a:off x="2200264" y="2958577"/>
             <a:ext cx="829309" cy="829309"/>
           </a:xfrm>
           <a:prstGeom prst="rect">
@@ -4794,7 +4785,7 @@
                 <a14:useLocalDpi xmlns:a14="http://schemas.microsoft.com/office/drawing/2010/main" val="0"/>
               </a:ext>
               <a:ext uri="{96DAC541-7B7A-43D3-8B79-37D633B846F1}">
-                <asvg:svgBlip xmlns:asvg="http://schemas.microsoft.com/office/drawing/2016/SVG/main" xmlns="" r:embed="rId7"/>
+                <asvg:svgBlip xmlns:asvg="http://schemas.microsoft.com/office/drawing/2016/SVG/main" r:embed="rId7"/>
               </a:ext>
             </a:extLst>
           </a:blip>
@@ -4804,7 +4795,7 @@
         </p:blipFill>
         <p:spPr>
           <a:xfrm>
-            <a:off x="8595526" y="2980257"/>
+            <a:off x="8454568" y="2954759"/>
             <a:ext cx="829309" cy="829309"/>
           </a:xfrm>
           <a:prstGeom prst="rect">
@@ -4833,7 +4824,7 @@
                 <a14:useLocalDpi xmlns:a14="http://schemas.microsoft.com/office/drawing/2010/main" val="0"/>
               </a:ext>
               <a:ext uri="{96DAC541-7B7A-43D3-8B79-37D633B846F1}">
-                <asvg:svgBlip xmlns:asvg="http://schemas.microsoft.com/office/drawing/2016/SVG/main" xmlns="" r:embed="rId9"/>
+                <asvg:svgBlip xmlns:asvg="http://schemas.microsoft.com/office/drawing/2016/SVG/main" r:embed="rId9"/>
               </a:ext>
             </a:extLst>
           </a:blip>
@@ -4843,7 +4834,7 @@
         </p:blipFill>
         <p:spPr>
           <a:xfrm>
-            <a:off x="6438647" y="2975938"/>
+            <a:off x="6324936" y="2925052"/>
             <a:ext cx="829309" cy="829309"/>
           </a:xfrm>
           <a:prstGeom prst="rect">
@@ -4872,7 +4863,7 @@
                 <a14:useLocalDpi xmlns:a14="http://schemas.microsoft.com/office/drawing/2010/main" val="0"/>
               </a:ext>
               <a:ext uri="{96DAC541-7B7A-43D3-8B79-37D633B846F1}">
-                <asvg:svgBlip xmlns:asvg="http://schemas.microsoft.com/office/drawing/2016/SVG/main" xmlns="" r:embed="rId11"/>
+                <asvg:svgBlip xmlns:asvg="http://schemas.microsoft.com/office/drawing/2016/SVG/main" r:embed="rId11"/>
               </a:ext>
             </a:extLst>
           </a:blip>
@@ -4882,7 +4873,7 @@
         </p:blipFill>
         <p:spPr>
           <a:xfrm>
-            <a:off x="10523819" y="2994768"/>
+            <a:off x="10481956" y="2982948"/>
             <a:ext cx="829309" cy="829309"/>
           </a:xfrm>
           <a:prstGeom prst="rect">
@@ -4911,7 +4902,7 @@
                 <a14:useLocalDpi xmlns:a14="http://schemas.microsoft.com/office/drawing/2010/main" val="0"/>
               </a:ext>
               <a:ext uri="{96DAC541-7B7A-43D3-8B79-37D633B846F1}">
-                <asvg:svgBlip xmlns:asvg="http://schemas.microsoft.com/office/drawing/2016/SVG/main" xmlns="" r:embed="rId3"/>
+                <asvg:svgBlip xmlns:asvg="http://schemas.microsoft.com/office/drawing/2016/SVG/main" r:embed="rId3"/>
               </a:ext>
             </a:extLst>
           </a:blip>
@@ -4921,7 +4912,7 @@
         </p:blipFill>
         <p:spPr>
           <a:xfrm>
-            <a:off x="4380935" y="3000615"/>
+            <a:off x="4195304" y="2908303"/>
             <a:ext cx="829309" cy="829309"/>
           </a:xfrm>
           <a:prstGeom prst="rect">
@@ -4943,7 +4934,7 @@
         </p:nvSpPr>
         <p:spPr>
           <a:xfrm>
-            <a:off x="308256" y="2999356"/>
+            <a:off x="205224" y="2958577"/>
             <a:ext cx="2160565" cy="762260"/>
           </a:xfrm>
           <a:prstGeom prst="rect">
@@ -5111,7 +5102,7 @@
         </p:nvSpPr>
         <p:spPr>
           <a:xfrm>
-            <a:off x="225514" y="4006925"/>
+            <a:off x="205224" y="3995297"/>
             <a:ext cx="1981647" cy="762260"/>
           </a:xfrm>
           <a:prstGeom prst="rect">
@@ -5161,7 +5152,7 @@
         </p:nvSpPr>
         <p:spPr>
           <a:xfrm>
-            <a:off x="248838" y="4948227"/>
+            <a:off x="207558" y="4935011"/>
             <a:ext cx="1981647" cy="734240"/>
           </a:xfrm>
           <a:prstGeom prst="rect">
@@ -5259,7 +5250,7 @@
                 <a14:useLocalDpi xmlns:a14="http://schemas.microsoft.com/office/drawing/2010/main" val="0"/>
               </a:ext>
               <a:ext uri="{96DAC541-7B7A-43D3-8B79-37D633B846F1}">
-                <asvg:svgBlip xmlns:asvg="http://schemas.microsoft.com/office/drawing/2016/SVG/main" xmlns="" r:embed="rId13"/>
+                <asvg:svgBlip xmlns:asvg="http://schemas.microsoft.com/office/drawing/2016/SVG/main" r:embed="rId13"/>
               </a:ext>
             </a:extLst>
           </a:blip>
@@ -5298,7 +5289,7 @@
                 <a14:useLocalDpi xmlns:a14="http://schemas.microsoft.com/office/drawing/2010/main" val="0"/>
               </a:ext>
               <a:ext uri="{96DAC541-7B7A-43D3-8B79-37D633B846F1}">
-                <asvg:svgBlip xmlns:asvg="http://schemas.microsoft.com/office/drawing/2016/SVG/main" xmlns="" r:embed="rId15"/>
+                <asvg:svgBlip xmlns:asvg="http://schemas.microsoft.com/office/drawing/2016/SVG/main" r:embed="rId15"/>
               </a:ext>
             </a:extLst>
           </a:blip>
@@ -5337,7 +5328,7 @@
                 <a14:useLocalDpi xmlns:a14="http://schemas.microsoft.com/office/drawing/2010/main" val="0"/>
               </a:ext>
               <a:ext uri="{96DAC541-7B7A-43D3-8B79-37D633B846F1}">
-                <asvg:svgBlip xmlns:asvg="http://schemas.microsoft.com/office/drawing/2016/SVG/main" xmlns="" r:embed="rId17"/>
+                <asvg:svgBlip xmlns:asvg="http://schemas.microsoft.com/office/drawing/2016/SVG/main" r:embed="rId17"/>
               </a:ext>
             </a:extLst>
           </a:blip>
@@ -5376,7 +5367,7 @@
                 <a14:useLocalDpi xmlns:a14="http://schemas.microsoft.com/office/drawing/2010/main" val="0"/>
               </a:ext>
               <a:ext uri="{96DAC541-7B7A-43D3-8B79-37D633B846F1}">
-                <asvg:svgBlip xmlns:asvg="http://schemas.microsoft.com/office/drawing/2016/SVG/main" xmlns="" r:embed="rId19"/>
+                <asvg:svgBlip xmlns:asvg="http://schemas.microsoft.com/office/drawing/2016/SVG/main" r:embed="rId19"/>
               </a:ext>
             </a:extLst>
           </a:blip>
@@ -5415,7 +5406,7 @@
                 <a14:useLocalDpi xmlns:a14="http://schemas.microsoft.com/office/drawing/2010/main" val="0"/>
               </a:ext>
               <a:ext uri="{96DAC541-7B7A-43D3-8B79-37D633B846F1}">
-                <asvg:svgBlip xmlns:asvg="http://schemas.microsoft.com/office/drawing/2016/SVG/main" xmlns="" r:embed="rId21"/>
+                <asvg:svgBlip xmlns:asvg="http://schemas.microsoft.com/office/drawing/2016/SVG/main" r:embed="rId21"/>
               </a:ext>
             </a:extLst>
           </a:blip>
@@ -5518,13 +5509,7 @@
               <a:rPr lang="pt-BR" sz="1400" dirty="0">
                 <a:latin typeface="Exo 2" panose="00000500000000000000" pitchFamily="50" charset="0"/>
               </a:rPr>
-              <a:t>Uma busca de alimentos mais funcional, aonde o usuário possa  realizar pesquisas</a:t>
-            </a:r>
-            <a:r>
-              <a:rPr lang="pt-BR" sz="1400" dirty="0" smtClean="0">
-                <a:latin typeface="Exo 2" panose="00000500000000000000" pitchFamily="50" charset="0"/>
-              </a:rPr>
-              <a:t>;</a:t>
+              <a:t>Uma busca de alimentos mais funcional, aonde o usuário possa  realizar pesquisas;</a:t>
             </a:r>
           </a:p>
           <a:p>
@@ -5533,19 +5518,19 @@
               <a:buChar char="•"/>
             </a:pPr>
             <a:r>
-              <a:rPr lang="pt-BR" sz="1400" dirty="0" smtClean="0">
+              <a:rPr lang="pt-BR" sz="1400" dirty="0">
                 <a:latin typeface="Exo 2" panose="00000500000000000000" pitchFamily="50" charset="0"/>
               </a:rPr>
               <a:t>Tutorial de como utilizar o </a:t>
             </a:r>
             <a:r>
-              <a:rPr lang="pt-BR" sz="1400" dirty="0" err="1" smtClean="0">
+              <a:rPr lang="pt-BR" sz="1400" dirty="0" err="1">
                 <a:latin typeface="Exo 2" panose="00000500000000000000" pitchFamily="50" charset="0"/>
               </a:rPr>
               <a:t>app</a:t>
             </a:r>
             <a:r>
-              <a:rPr lang="pt-BR" sz="1400" dirty="0" smtClean="0">
+              <a:rPr lang="pt-BR" sz="1400" dirty="0">
                 <a:latin typeface="Exo 2" panose="00000500000000000000" pitchFamily="50" charset="0"/>
               </a:rPr>
               <a:t>, a fim de usufruir com mais precisão  das ferramentas que a aplicação fornece;</a:t>
@@ -5557,19 +5542,19 @@
               <a:buChar char="•"/>
             </a:pPr>
             <a:r>
-              <a:rPr lang="pt-BR" sz="1400" dirty="0" smtClean="0">
+              <a:rPr lang="pt-BR" sz="1400" dirty="0">
                 <a:latin typeface="Exo 2" panose="00000500000000000000" pitchFamily="50" charset="0"/>
               </a:rPr>
               <a:t>Utilização do conceito da metáfora da vida real, para que o usuário se sinta conectado com o </a:t>
             </a:r>
             <a:r>
-              <a:rPr lang="pt-BR" sz="1400" dirty="0" err="1" smtClean="0">
+              <a:rPr lang="pt-BR" sz="1400" dirty="0" err="1">
                 <a:latin typeface="Exo 2" panose="00000500000000000000" pitchFamily="50" charset="0"/>
               </a:rPr>
               <a:t>app</a:t>
             </a:r>
             <a:r>
-              <a:rPr lang="pt-BR" sz="1400" dirty="0" smtClean="0">
+              <a:rPr lang="pt-BR" sz="1400" dirty="0">
                 <a:latin typeface="Exo 2" panose="00000500000000000000" pitchFamily="50" charset="0"/>
               </a:rPr>
               <a:t>, incentivando-o a continuar com o progresso. </a:t>
@@ -5839,19 +5824,19 @@
           </a:p>
           <a:p>
             <a:r>
-              <a:rPr lang="pt-BR" sz="1350" dirty="0" smtClean="0">
+              <a:rPr lang="pt-BR" sz="1350" dirty="0">
                 <a:latin typeface="Exo 2" panose="00000500000000000000" pitchFamily="50" charset="0"/>
               </a:rPr>
               <a:t>Visualiza um “</a:t>
             </a:r>
             <a:r>
-              <a:rPr lang="pt-BR" sz="1350" dirty="0" err="1" smtClean="0">
+              <a:rPr lang="pt-BR" sz="1350" dirty="0" err="1">
                 <a:latin typeface="Exo 2" panose="00000500000000000000" pitchFamily="50" charset="0"/>
               </a:rPr>
               <a:t>feed</a:t>
             </a:r>
             <a:r>
-              <a:rPr lang="pt-BR" sz="1350" dirty="0" smtClean="0">
+              <a:rPr lang="pt-BR" sz="1350" dirty="0">
                 <a:latin typeface="Exo 2" panose="00000500000000000000" pitchFamily="50" charset="0"/>
               </a:rPr>
               <a:t>” com diversas recomendações de dietas;</a:t>
@@ -5859,7 +5844,7 @@
           </a:p>
           <a:p>
             <a:r>
-              <a:rPr lang="pt-BR" sz="1350" dirty="0" smtClean="0">
+              <a:rPr lang="pt-BR" sz="1350" dirty="0">
                 <a:latin typeface="Exo 2" panose="00000500000000000000" pitchFamily="50" charset="0"/>
               </a:rPr>
               <a:t>Área para adicionar suas refeições diária;</a:t>
@@ -5867,14 +5852,11 @@
           </a:p>
           <a:p>
             <a:r>
-              <a:rPr lang="pt-BR" sz="1350" dirty="0" smtClean="0">
+              <a:rPr lang="pt-BR" sz="1350" dirty="0">
                 <a:latin typeface="Exo 2" panose="00000500000000000000" pitchFamily="50" charset="0"/>
               </a:rPr>
               <a:t>Adicionar um tipo de exercício físico;</a:t>
             </a:r>
-            <a:endParaRPr lang="pt-BR" sz="1350" dirty="0">
-              <a:latin typeface="Exo 2" panose="00000500000000000000" pitchFamily="50" charset="0"/>
-            </a:endParaRPr>
           </a:p>
         </p:txBody>
       </p:sp>
@@ -5892,7 +5874,7 @@
         </p:nvSpPr>
         <p:spPr>
           <a:xfrm>
-            <a:off x="5986074" y="1245971"/>
+            <a:off x="6010986" y="1355014"/>
             <a:ext cx="1649124" cy="1585049"/>
           </a:xfrm>
           <a:prstGeom prst="rect">
@@ -5914,126 +5896,102 @@
               <a:rPr lang="pt-BR" sz="1350" dirty="0">
                 <a:latin typeface="Exo 2" panose="00000500000000000000" pitchFamily="50" charset="0"/>
               </a:rPr>
-              <a:t>Informa ao aplicativo o objetivo final e o tempo que chegará nessa meta</a:t>
-            </a:r>
-            <a:r>
-              <a:rPr lang="pt-BR" sz="1350" dirty="0" smtClean="0">
+              <a:t>Informa ao aplicativo o objetivo final e o tempo que chegará nessa meta.</a:t>
+            </a:r>
+          </a:p>
+        </p:txBody>
+      </p:sp>
+      <p:sp>
+        <p:nvSpPr>
+          <p:cNvPr id="48" name="Retângulo 47">
+            <a:extLst>
+              <a:ext uri="{FF2B5EF4-FFF2-40B4-BE49-F238E27FC236}">
+                <a16:creationId xmlns:a16="http://schemas.microsoft.com/office/drawing/2014/main" id="{B0DAEFE2-B053-4400-817E-119A72F0419E}"/>
+              </a:ext>
+            </a:extLst>
+          </p:cNvPr>
+          <p:cNvSpPr/>
+          <p:nvPr/>
+        </p:nvSpPr>
+        <p:spPr>
+          <a:xfrm>
+            <a:off x="7625039" y="1478125"/>
+            <a:ext cx="2685528" cy="1338828"/>
+          </a:xfrm>
+          <a:prstGeom prst="rect">
+            <a:avLst/>
+          </a:prstGeom>
+        </p:spPr>
+        <p:txBody>
+          <a:bodyPr wrap="square">
+            <a:spAutoFit/>
+          </a:bodyPr>
+          <a:lstStyle/>
+          <a:p>
+            <a:r>
+              <a:rPr lang="pt-BR" sz="1350" dirty="0">
+                <a:latin typeface="Exo 2" panose="00000500000000000000" pitchFamily="50" charset="0"/>
+              </a:rPr>
+              <a:t>Seleciona qual refeição está fazendo e quais alimentos irá conter nela;</a:t>
+            </a:r>
+          </a:p>
+          <a:p>
+            <a:r>
+              <a:rPr lang="pt-BR" sz="1350" dirty="0">
+                <a:latin typeface="Exo 2" panose="00000500000000000000" pitchFamily="50" charset="0"/>
+              </a:rPr>
+              <a:t>Pode selecionar algumas recomendações de receitas;</a:t>
+            </a:r>
+          </a:p>
+          <a:p>
+            <a:r>
+              <a:rPr lang="pt-BR" sz="1350" dirty="0">
+                <a:latin typeface="Exo 2" panose="00000500000000000000" pitchFamily="50" charset="0"/>
+              </a:rPr>
+              <a:t>Visualiza os alimentos consumidos.</a:t>
+            </a:r>
+          </a:p>
+        </p:txBody>
+      </p:sp>
+      <p:sp>
+        <p:nvSpPr>
+          <p:cNvPr id="52" name="Retângulo 51">
+            <a:extLst>
+              <a:ext uri="{FF2B5EF4-FFF2-40B4-BE49-F238E27FC236}">
+                <a16:creationId xmlns:a16="http://schemas.microsoft.com/office/drawing/2014/main" id="{54981E70-EBFB-439A-8701-68EDD526B241}"/>
+              </a:ext>
+            </a:extLst>
+          </p:cNvPr>
+          <p:cNvSpPr/>
+          <p:nvPr/>
+        </p:nvSpPr>
+        <p:spPr>
+          <a:xfrm>
+            <a:off x="10196877" y="1488146"/>
+            <a:ext cx="1503112" cy="1377300"/>
+          </a:xfrm>
+          <a:prstGeom prst="rect">
+            <a:avLst/>
+          </a:prstGeom>
+        </p:spPr>
+        <p:txBody>
+          <a:bodyPr wrap="square">
+            <a:spAutoFit/>
+          </a:bodyPr>
+          <a:lstStyle/>
+          <a:p>
+            <a:r>
+              <a:rPr lang="pt-BR" sz="1350" dirty="0">
+                <a:latin typeface="Exo 2" panose="00000500000000000000" pitchFamily="50" charset="0"/>
+              </a:rPr>
+              <a:t>Após selecionar alimento visualiza as calorias e no final do dia o total ingerido</a:t>
+            </a:r>
+            <a:r>
+              <a:rPr lang="pt-BR" sz="1600" dirty="0">
                 <a:latin typeface="Exo 2" panose="00000500000000000000" pitchFamily="50" charset="0"/>
               </a:rPr>
               <a:t>.</a:t>
             </a:r>
-          </a:p>
-        </p:txBody>
-      </p:sp>
-      <p:sp>
-        <p:nvSpPr>
-          <p:cNvPr id="48" name="Retângulo 47">
-            <a:extLst>
-              <a:ext uri="{FF2B5EF4-FFF2-40B4-BE49-F238E27FC236}">
-                <a16:creationId xmlns:a16="http://schemas.microsoft.com/office/drawing/2014/main" id="{B0DAEFE2-B053-4400-817E-119A72F0419E}"/>
-              </a:ext>
-            </a:extLst>
-          </p:cNvPr>
-          <p:cNvSpPr/>
-          <p:nvPr/>
-        </p:nvSpPr>
-        <p:spPr>
-          <a:xfrm>
-            <a:off x="7586120" y="1415411"/>
-            <a:ext cx="2907503" cy="1546577"/>
-          </a:xfrm>
-          <a:prstGeom prst="rect">
-            <a:avLst/>
-          </a:prstGeom>
-        </p:spPr>
-        <p:txBody>
-          <a:bodyPr wrap="square">
-            <a:spAutoFit/>
-          </a:bodyPr>
-          <a:lstStyle/>
-          <a:p>
-            <a:r>
-              <a:rPr lang="pt-BR" sz="1350" dirty="0">
-                <a:latin typeface="Exo 2" panose="00000500000000000000" pitchFamily="50" charset="0"/>
-              </a:rPr>
-              <a:t>Seleciona qual refeição está fazendo e quais alimentos irá conter </a:t>
-            </a:r>
-            <a:r>
-              <a:rPr lang="pt-BR" sz="1350" dirty="0" smtClean="0">
-                <a:latin typeface="Exo 2" panose="00000500000000000000" pitchFamily="50" charset="0"/>
-              </a:rPr>
-              <a:t>nela;</a:t>
-            </a:r>
-          </a:p>
-          <a:p>
-            <a:r>
-              <a:rPr lang="pt-BR" sz="1350" dirty="0" smtClean="0">
-                <a:latin typeface="Exo 2" panose="00000500000000000000" pitchFamily="50" charset="0"/>
-              </a:rPr>
-              <a:t>Pode selecionar algumas recomendações de receitas;</a:t>
-            </a:r>
-          </a:p>
-          <a:p>
-            <a:r>
-              <a:rPr lang="pt-BR" sz="1350" dirty="0" smtClean="0">
-                <a:latin typeface="Exo 2" panose="00000500000000000000" pitchFamily="50" charset="0"/>
-              </a:rPr>
-              <a:t>Visualiza os alimentos consumidos.</a:t>
-            </a:r>
-            <a:endParaRPr lang="pt-BR" sz="1350" dirty="0">
-              <a:latin typeface="Exo 2" panose="00000500000000000000" pitchFamily="50" charset="0"/>
-            </a:endParaRPr>
-          </a:p>
-        </p:txBody>
-      </p:sp>
-      <p:sp>
-        <p:nvSpPr>
-          <p:cNvPr id="52" name="Retângulo 51">
-            <a:extLst>
-              <a:ext uri="{FF2B5EF4-FFF2-40B4-BE49-F238E27FC236}">
-                <a16:creationId xmlns:a16="http://schemas.microsoft.com/office/drawing/2014/main" id="{54981E70-EBFB-439A-8701-68EDD526B241}"/>
-              </a:ext>
-            </a:extLst>
-          </p:cNvPr>
-          <p:cNvSpPr/>
-          <p:nvPr/>
-        </p:nvSpPr>
-        <p:spPr>
-          <a:xfrm>
-            <a:off x="10196877" y="1488146"/>
-            <a:ext cx="1503112" cy="1377300"/>
-          </a:xfrm>
-          <a:prstGeom prst="rect">
-            <a:avLst/>
-          </a:prstGeom>
-        </p:spPr>
-        <p:txBody>
-          <a:bodyPr wrap="square">
-            <a:spAutoFit/>
-          </a:bodyPr>
-          <a:lstStyle/>
-          <a:p>
-            <a:r>
-              <a:rPr lang="pt-BR" sz="1350" dirty="0">
-                <a:latin typeface="Exo 2" panose="00000500000000000000" pitchFamily="50" charset="0"/>
-              </a:rPr>
-              <a:t>Após selecionar alimento visualiza </a:t>
-            </a:r>
-            <a:r>
-              <a:rPr lang="pt-BR" sz="1350" dirty="0" smtClean="0">
-                <a:latin typeface="Exo 2" panose="00000500000000000000" pitchFamily="50" charset="0"/>
-              </a:rPr>
-              <a:t>as calorias e no final do dia o total ingerido</a:t>
-            </a:r>
-            <a:r>
-              <a:rPr lang="pt-BR" sz="1600" dirty="0" smtClean="0">
-                <a:latin typeface="Exo 2" panose="00000500000000000000" pitchFamily="50" charset="0"/>
-              </a:rPr>
-              <a:t>.</a:t>
-            </a:r>
-            <a:endParaRPr lang="pt-BR" sz="1600" dirty="0">
-              <a:latin typeface="Exo 2" panose="00000500000000000000" pitchFamily="50" charset="0"/>
-            </a:endParaRPr>
           </a:p>
         </p:txBody>
       </p:sp>
@@ -6407,7 +6365,7 @@
         <p:spPr>
           <a:xfrm>
             <a:off x="10271648" y="3900270"/>
-            <a:ext cx="2123090" cy="830997"/>
+            <a:ext cx="1920352" cy="1077218"/>
           </a:xfrm>
           <a:prstGeom prst="rect">
             <a:avLst/>
@@ -6438,13 +6396,6 @@
   <p:clrMapOvr>
     <a:masterClrMapping/>
   </p:clrMapOvr>
-  <p:timing>
-    <p:tnLst>
-      <p:par>
-        <p:cTn id="1" dur="indefinite" restart="never" nodeType="tmRoot"/>
-      </p:par>
-    </p:tnLst>
-  </p:timing>
 </p:sld>
 </file>
 

</xml_diff>